<commit_message>
Add ESP8266 in architecture.
</commit_message>
<xml_diff>
--- a/Doc/KoboPageTurner.pptx
+++ b/Doc/KoboPageTurner.pptx
@@ -304,7 +304,7 @@
           <a:p>
             <a:fld id="{39CEB168-9388-49C1-A380-FF4F9B9BF650}" type="datetimeFigureOut">
               <a:rPr lang="zh-TW" altLang="en-US" smtClean="0"/>
-              <a:t>2020/8/18</a:t>
+              <a:t>2020/8/20</a:t>
             </a:fld>
             <a:endParaRPr lang="zh-TW" altLang="en-US"/>
           </a:p>
@@ -469,7 +469,7 @@
           <a:p>
             <a:fld id="{39CEB168-9388-49C1-A380-FF4F9B9BF650}" type="datetimeFigureOut">
               <a:rPr lang="zh-TW" altLang="en-US" smtClean="0"/>
-              <a:t>2020/8/18</a:t>
+              <a:t>2020/8/20</a:t>
             </a:fld>
             <a:endParaRPr lang="zh-TW" altLang="en-US"/>
           </a:p>
@@ -644,7 +644,7 @@
           <a:p>
             <a:fld id="{39CEB168-9388-49C1-A380-FF4F9B9BF650}" type="datetimeFigureOut">
               <a:rPr lang="zh-TW" altLang="en-US" smtClean="0"/>
-              <a:t>2020/8/18</a:t>
+              <a:t>2020/8/20</a:t>
             </a:fld>
             <a:endParaRPr lang="zh-TW" altLang="en-US"/>
           </a:p>
@@ -809,7 +809,7 @@
           <a:p>
             <a:fld id="{39CEB168-9388-49C1-A380-FF4F9B9BF650}" type="datetimeFigureOut">
               <a:rPr lang="zh-TW" altLang="en-US" smtClean="0"/>
-              <a:t>2020/8/18</a:t>
+              <a:t>2020/8/20</a:t>
             </a:fld>
             <a:endParaRPr lang="zh-TW" altLang="en-US"/>
           </a:p>
@@ -1050,7 +1050,7 @@
           <a:p>
             <a:fld id="{39CEB168-9388-49C1-A380-FF4F9B9BF650}" type="datetimeFigureOut">
               <a:rPr lang="zh-TW" altLang="en-US" smtClean="0"/>
-              <a:t>2020/8/18</a:t>
+              <a:t>2020/8/20</a:t>
             </a:fld>
             <a:endParaRPr lang="zh-TW" altLang="en-US"/>
           </a:p>
@@ -1333,7 +1333,7 @@
           <a:p>
             <a:fld id="{39CEB168-9388-49C1-A380-FF4F9B9BF650}" type="datetimeFigureOut">
               <a:rPr lang="zh-TW" altLang="en-US" smtClean="0"/>
-              <a:t>2020/8/18</a:t>
+              <a:t>2020/8/20</a:t>
             </a:fld>
             <a:endParaRPr lang="zh-TW" altLang="en-US"/>
           </a:p>
@@ -1750,7 +1750,7 @@
           <a:p>
             <a:fld id="{39CEB168-9388-49C1-A380-FF4F9B9BF650}" type="datetimeFigureOut">
               <a:rPr lang="zh-TW" altLang="en-US" smtClean="0"/>
-              <a:t>2020/8/18</a:t>
+              <a:t>2020/8/20</a:t>
             </a:fld>
             <a:endParaRPr lang="zh-TW" altLang="en-US"/>
           </a:p>
@@ -1863,7 +1863,7 @@
           <a:p>
             <a:fld id="{39CEB168-9388-49C1-A380-FF4F9B9BF650}" type="datetimeFigureOut">
               <a:rPr lang="zh-TW" altLang="en-US" smtClean="0"/>
-              <a:t>2020/8/18</a:t>
+              <a:t>2020/8/20</a:t>
             </a:fld>
             <a:endParaRPr lang="zh-TW" altLang="en-US"/>
           </a:p>
@@ -1953,7 +1953,7 @@
           <a:p>
             <a:fld id="{39CEB168-9388-49C1-A380-FF4F9B9BF650}" type="datetimeFigureOut">
               <a:rPr lang="zh-TW" altLang="en-US" smtClean="0"/>
-              <a:t>2020/8/18</a:t>
+              <a:t>2020/8/20</a:t>
             </a:fld>
             <a:endParaRPr lang="zh-TW" altLang="en-US"/>
           </a:p>
@@ -2225,7 +2225,7 @@
           <a:p>
             <a:fld id="{39CEB168-9388-49C1-A380-FF4F9B9BF650}" type="datetimeFigureOut">
               <a:rPr lang="zh-TW" altLang="en-US" smtClean="0"/>
-              <a:t>2020/8/18</a:t>
+              <a:t>2020/8/20</a:t>
             </a:fld>
             <a:endParaRPr lang="zh-TW" altLang="en-US"/>
           </a:p>
@@ -2473,7 +2473,7 @@
           <a:p>
             <a:fld id="{39CEB168-9388-49C1-A380-FF4F9B9BF650}" type="datetimeFigureOut">
               <a:rPr lang="zh-TW" altLang="en-US" smtClean="0"/>
-              <a:t>2020/8/18</a:t>
+              <a:t>2020/8/20</a:t>
             </a:fld>
             <a:endParaRPr lang="zh-TW" altLang="en-US"/>
           </a:p>
@@ -2681,7 +2681,7 @@
           <a:p>
             <a:fld id="{39CEB168-9388-49C1-A380-FF4F9B9BF650}" type="datetimeFigureOut">
               <a:rPr lang="zh-TW" altLang="en-US" smtClean="0"/>
-              <a:t>2020/8/18</a:t>
+              <a:t>2020/8/20</a:t>
             </a:fld>
             <a:endParaRPr lang="zh-TW" altLang="en-US"/>
           </a:p>
@@ -3121,15 +3121,7 @@
                   <a:schemeClr val="tx1"/>
                 </a:solidFill>
               </a:rPr>
-              <a:t> </a:t>
-            </a:r>
-            <a:r>
-              <a:rPr lang="en-US" altLang="zh-TW" dirty="0" smtClean="0">
-                <a:solidFill>
-                  <a:schemeClr val="tx1"/>
-                </a:solidFill>
-              </a:rPr>
-              <a:t>)</a:t>
+              <a:t> )</a:t>
             </a:r>
             <a:endParaRPr lang="zh-TW" altLang="en-US" dirty="0">
               <a:solidFill>
@@ -3281,19 +3273,7 @@
           <a:p>
             <a:r>
               <a:rPr lang="en-US" altLang="zh-TW" dirty="0" smtClean="0"/>
-              <a:t>           </a:t>
-            </a:r>
-            <a:r>
-              <a:rPr lang="en-US" altLang="zh-TW" dirty="0" smtClean="0"/>
-              <a:t> Kobo </a:t>
-            </a:r>
-            <a:r>
-              <a:rPr lang="en-US" altLang="zh-TW" dirty="0" smtClean="0"/>
-              <a:t>Clara HD  </a:t>
-            </a:r>
-            <a:r>
-              <a:rPr lang="en-US" altLang="zh-TW" dirty="0" smtClean="0"/>
-              <a:t>                                         Cell Phone                           Bluetooth Device</a:t>
+              <a:t>            Kobo Clara HD                                           Cell Phone                           Bluetooth Device</a:t>
             </a:r>
             <a:endParaRPr lang="zh-TW" altLang="en-US" dirty="0"/>
           </a:p>
@@ -3560,11 +3540,6 @@
               </a:rPr>
               <a:t>Key Down Event</a:t>
             </a:r>
-            <a:endParaRPr lang="en-US" altLang="zh-TW" dirty="0" smtClean="0">
-              <a:solidFill>
-                <a:schemeClr val="tx1"/>
-              </a:solidFill>
-            </a:endParaRPr>
           </a:p>
         </p:txBody>
       </p:sp>
@@ -3601,6 +3576,89 @@
           </a:fontRef>
         </p:style>
       </p:cxnSp>
+      <p:sp>
+        <p:nvSpPr>
+          <p:cNvPr id="2" name="矩形 1"/>
+          <p:cNvSpPr/>
+          <p:nvPr/>
+        </p:nvSpPr>
+        <p:spPr>
+          <a:xfrm>
+            <a:off x="3707904" y="2708920"/>
+            <a:ext cx="4968552" cy="2808312"/>
+          </a:xfrm>
+          <a:prstGeom prst="rect">
+            <a:avLst/>
+          </a:prstGeom>
+          <a:noFill/>
+        </p:spPr>
+        <p:style>
+          <a:lnRef idx="2">
+            <a:schemeClr val="accent6">
+              <a:shade val="50000"/>
+            </a:schemeClr>
+          </a:lnRef>
+          <a:fillRef idx="1">
+            <a:schemeClr val="accent6"/>
+          </a:fillRef>
+          <a:effectRef idx="0">
+            <a:schemeClr val="accent6"/>
+          </a:effectRef>
+          <a:fontRef idx="minor">
+            <a:schemeClr val="lt1"/>
+          </a:fontRef>
+        </p:style>
+        <p:txBody>
+          <a:bodyPr rtlCol="0" anchor="ctr"/>
+          <a:lstStyle/>
+          <a:p>
+            <a:pPr algn="ctr"/>
+            <a:endParaRPr lang="zh-TW" altLang="en-US"/>
+          </a:p>
+        </p:txBody>
+      </p:sp>
+      <p:sp>
+        <p:nvSpPr>
+          <p:cNvPr id="3" name="文字方塊 2"/>
+          <p:cNvSpPr txBox="1"/>
+          <p:nvPr/>
+        </p:nvSpPr>
+        <p:spPr>
+          <a:xfrm>
+            <a:off x="4860032" y="5651956"/>
+            <a:ext cx="3456384" cy="369332"/>
+          </a:xfrm>
+          <a:prstGeom prst="rect">
+            <a:avLst/>
+          </a:prstGeom>
+          <a:noFill/>
+        </p:spPr>
+        <p:txBody>
+          <a:bodyPr wrap="square" rtlCol="0">
+            <a:spAutoFit/>
+          </a:bodyPr>
+          <a:lstStyle/>
+          <a:p>
+            <a:r>
+              <a:rPr lang="en-US" altLang="zh-TW" dirty="0" smtClean="0">
+                <a:solidFill>
+                  <a:schemeClr val="accent6">
+                    <a:lumMod val="50000"/>
+                  </a:schemeClr>
+                </a:solidFill>
+              </a:rPr>
+              <a:t>ESP8266 Hardware Page-Turner</a:t>
+            </a:r>
+            <a:endParaRPr lang="zh-TW" altLang="en-US" dirty="0">
+              <a:solidFill>
+                <a:schemeClr val="accent6">
+                  <a:lumMod val="50000"/>
+                </a:schemeClr>
+              </a:solidFill>
+            </a:endParaRPr>
+          </a:p>
+        </p:txBody>
+      </p:sp>
     </p:spTree>
   </p:cSld>
   <p:clrMapOvr>

</xml_diff>